<commit_message>
get ready new version of dprep
</commit_message>
<xml_diff>
--- a/slides/figures.pptx
+++ b/slides/figures.pptx
@@ -4596,10 +4596,10 @@
       </p:grpSpPr>
       <p:sp>
         <p:nvSpPr>
-          <p:cNvPr id="49" name="Down Arrow 48">
-            <a:extLst>
-              <a:ext uri="{FF2B5EF4-FFF2-40B4-BE49-F238E27FC236}">
-                <a16:creationId xmlns:a16="http://schemas.microsoft.com/office/drawing/2014/main" id="{FC648DEE-7250-204B-969A-61736E87CD66}"/>
+          <p:cNvPr id="3" name="Rectangle 2">
+            <a:extLst>
+              <a:ext uri="{FF2B5EF4-FFF2-40B4-BE49-F238E27FC236}">
+                <a16:creationId xmlns:a16="http://schemas.microsoft.com/office/drawing/2014/main" id="{BB34B60A-08E2-B64A-8F9C-388FF06A35B6}"/>
               </a:ext>
             </a:extLst>
           </p:cNvPr>
@@ -4607,13 +4607,16 @@
           <p:nvPr/>
         </p:nvSpPr>
         <p:spPr>
-          <a:xfrm rot="16200000">
-            <a:off x="6855207" y="-1144701"/>
-            <a:ext cx="287244" cy="5827600"/>
-          </a:xfrm>
-          <a:prstGeom prst="downArrow">
+          <a:xfrm>
+            <a:off x="838468" y="715618"/>
+            <a:ext cx="8044275" cy="2519266"/>
+          </a:xfrm>
+          <a:prstGeom prst="rect">
             <a:avLst/>
           </a:prstGeom>
+          <a:solidFill>
+            <a:schemeClr val="bg1"/>
+          </a:solidFill>
         </p:spPr>
         <p:style>
           <a:lnRef idx="2">
@@ -4642,10 +4645,10 @@
       </p:sp>
       <p:sp>
         <p:nvSpPr>
-          <p:cNvPr id="2" name="Down Arrow 1">
-            <a:extLst>
-              <a:ext uri="{FF2B5EF4-FFF2-40B4-BE49-F238E27FC236}">
-                <a16:creationId xmlns:a16="http://schemas.microsoft.com/office/drawing/2014/main" id="{089F740E-9F83-6F4F-A2C5-EFE0E15472AE}"/>
+          <p:cNvPr id="49" name="Down Arrow 48">
+            <a:extLst>
+              <a:ext uri="{FF2B5EF4-FFF2-40B4-BE49-F238E27FC236}">
+                <a16:creationId xmlns:a16="http://schemas.microsoft.com/office/drawing/2014/main" id="{FC648DEE-7250-204B-969A-61736E87CD66}"/>
               </a:ext>
             </a:extLst>
           </p:cNvPr>
@@ -4653,9 +4656,9 @@
           <p:nvPr/>
         </p:nvSpPr>
         <p:spPr>
-          <a:xfrm>
-            <a:off x="1391478" y="1155214"/>
-            <a:ext cx="291548" cy="2409621"/>
+          <a:xfrm rot="16200000">
+            <a:off x="5549999" y="-1254237"/>
+            <a:ext cx="287244" cy="6058930"/>
           </a:xfrm>
           <a:prstGeom prst="downArrow">
             <a:avLst/>
@@ -4688,10 +4691,10 @@
       </p:sp>
       <p:sp>
         <p:nvSpPr>
-          <p:cNvPr id="52" name="Rectangle 51">
-            <a:extLst>
-              <a:ext uri="{FF2B5EF4-FFF2-40B4-BE49-F238E27FC236}">
-                <a16:creationId xmlns:a16="http://schemas.microsoft.com/office/drawing/2014/main" id="{6524A324-6D8D-6F41-9CDE-0C7BD9C42EA7}"/>
+          <p:cNvPr id="2" name="Down Arrow 1">
+            <a:extLst>
+              <a:ext uri="{FF2B5EF4-FFF2-40B4-BE49-F238E27FC236}">
+                <a16:creationId xmlns:a16="http://schemas.microsoft.com/office/drawing/2014/main" id="{089F740E-9F83-6F4F-A2C5-EFE0E15472AE}"/>
               </a:ext>
             </a:extLst>
           </p:cNvPr>
@@ -4700,15 +4703,12 @@
         </p:nvSpPr>
         <p:spPr>
           <a:xfrm>
-            <a:off x="7987527" y="1382063"/>
-            <a:ext cx="1501200" cy="794771"/>
-          </a:xfrm>
-          <a:prstGeom prst="rect">
+            <a:off x="1444486" y="1427205"/>
+            <a:ext cx="320628" cy="1735108"/>
+          </a:xfrm>
+          <a:prstGeom prst="downArrow">
             <a:avLst/>
           </a:prstGeom>
-          <a:solidFill>
-            <a:schemeClr val="bg1"/>
-          </a:solidFill>
         </p:spPr>
         <p:style>
           <a:lnRef idx="2">
@@ -4731,64 +4731,16 @@
           <a:lstStyle/>
           <a:p>
             <a:pPr algn="ctr"/>
-            <a:r>
-              <a:rPr lang="en-NL" sz="1600" dirty="0">
-                <a:solidFill>
-                  <a:schemeClr val="tx1"/>
-                </a:solidFill>
-              </a:rPr>
-              <a:t>Evaluation and deployment</a:t>
-            </a:r>
-          </a:p>
-        </p:txBody>
-      </p:sp>
-      <p:cxnSp>
-        <p:nvCxnSpPr>
-          <p:cNvPr id="55" name="Straight Arrow Connector 54">
-            <a:extLst>
-              <a:ext uri="{FF2B5EF4-FFF2-40B4-BE49-F238E27FC236}">
-                <a16:creationId xmlns:a16="http://schemas.microsoft.com/office/drawing/2014/main" id="{C9432A2F-BAF6-E745-BEE3-E80D2B4A5166}"/>
-              </a:ext>
-            </a:extLst>
-          </p:cNvPr>
-          <p:cNvCxnSpPr>
-            <a:cxnSpLocks/>
-          </p:cNvCxnSpPr>
-          <p:nvPr/>
-        </p:nvCxnSpPr>
-        <p:spPr>
-          <a:xfrm flipV="1">
-            <a:off x="4670747" y="1625476"/>
-            <a:ext cx="745787" cy="16788"/>
-          </a:xfrm>
-          <a:prstGeom prst="straightConnector1">
-            <a:avLst/>
-          </a:prstGeom>
-          <a:ln>
-            <a:tailEnd type="triangle"/>
-          </a:ln>
-        </p:spPr>
-        <p:style>
-          <a:lnRef idx="1">
-            <a:schemeClr val="accent1"/>
-          </a:lnRef>
-          <a:fillRef idx="0">
-            <a:schemeClr val="accent1"/>
-          </a:fillRef>
-          <a:effectRef idx="0">
-            <a:schemeClr val="accent1"/>
-          </a:effectRef>
-          <a:fontRef idx="minor">
-            <a:schemeClr val="tx1"/>
-          </a:fontRef>
-        </p:style>
-      </p:cxnSp>
-      <p:sp>
-        <p:nvSpPr>
-          <p:cNvPr id="46" name="Rectangle 45">
-            <a:extLst>
-              <a:ext uri="{FF2B5EF4-FFF2-40B4-BE49-F238E27FC236}">
-                <a16:creationId xmlns:a16="http://schemas.microsoft.com/office/drawing/2014/main" id="{269B55B9-A809-4241-88FD-92320F15AABD}"/>
+            <a:endParaRPr lang="en-NL"/>
+          </a:p>
+        </p:txBody>
+      </p:sp>
+      <p:sp>
+        <p:nvSpPr>
+          <p:cNvPr id="52" name="Rectangle 51">
+            <a:extLst>
+              <a:ext uri="{FF2B5EF4-FFF2-40B4-BE49-F238E27FC236}">
+                <a16:creationId xmlns:a16="http://schemas.microsoft.com/office/drawing/2014/main" id="{6524A324-6D8D-6F41-9CDE-0C7BD9C42EA7}"/>
               </a:ext>
             </a:extLst>
           </p:cNvPr>
@@ -4797,8 +4749,8 @@
         </p:nvSpPr>
         <p:spPr>
           <a:xfrm>
-            <a:off x="2477142" y="1376668"/>
-            <a:ext cx="1607887" cy="794773"/>
+            <a:off x="7059459" y="1376667"/>
+            <a:ext cx="1396800" cy="795600"/>
           </a:xfrm>
           <a:prstGeom prst="rect">
             <a:avLst/>
@@ -4834,17 +4786,17 @@
                   <a:schemeClr val="tx1"/>
                 </a:solidFill>
               </a:rPr>
-              <a:t>Data exploration</a:t>
-            </a:r>
-          </a:p>
-        </p:txBody>
-      </p:sp>
-      <p:sp>
-        <p:nvSpPr>
-          <p:cNvPr id="54" name="Rectangle 53">
-            <a:extLst>
-              <a:ext uri="{FF2B5EF4-FFF2-40B4-BE49-F238E27FC236}">
-                <a16:creationId xmlns:a16="http://schemas.microsoft.com/office/drawing/2014/main" id="{2FFFBDDD-97F7-E64A-8C08-F6ECD5261B65}"/>
+              <a:t>Evaluation and deployment</a:t>
+            </a:r>
+          </a:p>
+        </p:txBody>
+      </p:sp>
+      <p:sp>
+        <p:nvSpPr>
+          <p:cNvPr id="46" name="Rectangle 45">
+            <a:extLst>
+              <a:ext uri="{FF2B5EF4-FFF2-40B4-BE49-F238E27FC236}">
+                <a16:creationId xmlns:a16="http://schemas.microsoft.com/office/drawing/2014/main" id="{269B55B9-A809-4241-88FD-92320F15AABD}"/>
               </a:ext>
             </a:extLst>
           </p:cNvPr>
@@ -4853,8 +4805,8 @@
         </p:nvSpPr>
         <p:spPr>
           <a:xfrm>
-            <a:off x="6191472" y="1382102"/>
-            <a:ext cx="1501200" cy="794772"/>
+            <a:off x="2477143" y="1376667"/>
+            <a:ext cx="1396800" cy="795600"/>
           </a:xfrm>
           <a:prstGeom prst="rect">
             <a:avLst/>
@@ -4890,17 +4842,17 @@
                   <a:schemeClr val="tx1"/>
                 </a:solidFill>
               </a:rPr>
-              <a:t>Analysis</a:t>
-            </a:r>
-          </a:p>
-        </p:txBody>
-      </p:sp>
-      <p:sp>
-        <p:nvSpPr>
-          <p:cNvPr id="56" name="Rectangle 55">
-            <a:extLst>
-              <a:ext uri="{FF2B5EF4-FFF2-40B4-BE49-F238E27FC236}">
-                <a16:creationId xmlns:a16="http://schemas.microsoft.com/office/drawing/2014/main" id="{5BD9E00E-298A-F04A-9AE9-484F874BA2E1}"/>
+              <a:t>Data exploration</a:t>
+            </a:r>
+          </a:p>
+        </p:txBody>
+      </p:sp>
+      <p:sp>
+        <p:nvSpPr>
+          <p:cNvPr id="54" name="Rectangle 53">
+            <a:extLst>
+              <a:ext uri="{FF2B5EF4-FFF2-40B4-BE49-F238E27FC236}">
+                <a16:creationId xmlns:a16="http://schemas.microsoft.com/office/drawing/2014/main" id="{2FFFBDDD-97F7-E64A-8C08-F6ECD5261B65}"/>
               </a:ext>
             </a:extLst>
           </p:cNvPr>
@@ -4909,8 +4861,8 @@
         </p:nvSpPr>
         <p:spPr>
           <a:xfrm>
-            <a:off x="4395418" y="1382101"/>
-            <a:ext cx="1501200" cy="748827"/>
+            <a:off x="5532021" y="1376667"/>
+            <a:ext cx="1396800" cy="795600"/>
           </a:xfrm>
           <a:prstGeom prst="rect">
             <a:avLst/>
@@ -4946,207 +4898,33 @@
                   <a:schemeClr val="tx1"/>
                 </a:solidFill>
               </a:rPr>
-              <a:t>Data </a:t>
-            </a:r>
-          </a:p>
-          <a:p>
-            <a:pPr algn="ctr"/>
-            <a:r>
-              <a:rPr lang="en-NL" sz="1600" dirty="0">
-                <a:solidFill>
-                  <a:schemeClr val="tx1"/>
-                </a:solidFill>
-              </a:rPr>
-              <a:t>preparation</a:t>
-            </a:r>
-          </a:p>
-        </p:txBody>
-      </p:sp>
-      <p:sp>
-        <p:nvSpPr>
-          <p:cNvPr id="32" name="TextBox 31">
-            <a:extLst>
-              <a:ext uri="{FF2B5EF4-FFF2-40B4-BE49-F238E27FC236}">
-                <a16:creationId xmlns:a16="http://schemas.microsoft.com/office/drawing/2014/main" id="{7B858282-D819-D84D-91DF-947CE524B0FA}"/>
-              </a:ext>
-            </a:extLst>
-          </p:cNvPr>
-          <p:cNvSpPr txBox="1"/>
-          <p:nvPr/>
-        </p:nvSpPr>
-        <p:spPr>
-          <a:xfrm>
-            <a:off x="1726142" y="4976945"/>
-            <a:ext cx="3814420" cy="1035122"/>
+              <a:t>Analysis</a:t>
+            </a:r>
+          </a:p>
+        </p:txBody>
+      </p:sp>
+      <p:sp>
+        <p:nvSpPr>
+          <p:cNvPr id="56" name="Rectangle 55">
+            <a:extLst>
+              <a:ext uri="{FF2B5EF4-FFF2-40B4-BE49-F238E27FC236}">
+                <a16:creationId xmlns:a16="http://schemas.microsoft.com/office/drawing/2014/main" id="{5BD9E00E-298A-F04A-9AE9-484F874BA2E1}"/>
+              </a:ext>
+            </a:extLst>
+          </p:cNvPr>
+          <p:cNvSpPr/>
+          <p:nvPr/>
+        </p:nvSpPr>
+        <p:spPr>
+          <a:xfrm>
+            <a:off x="4004582" y="1376667"/>
+            <a:ext cx="1396800" cy="795600"/>
           </a:xfrm>
           <a:prstGeom prst="rect">
             <a:avLst/>
           </a:prstGeom>
           <a:solidFill>
-            <a:srgbClr val="003365">
-              <a:alpha val="27843"/>
-            </a:srgbClr>
-          </a:solidFill>
-        </p:spPr>
-        <p:txBody>
-          <a:bodyPr wrap="none" rtlCol="0">
-            <a:noAutofit/>
-          </a:bodyPr>
-          <a:lstStyle/>
-          <a:p>
-            <a:r>
-              <a:rPr lang="en-NL" sz="1100" b="1" dirty="0"/>
-              <a:t>Tutorials (T1-T4)</a:t>
-            </a:r>
-          </a:p>
-          <a:p>
-            <a:r>
-              <a:rPr lang="en-NL" sz="1100" dirty="0"/>
-              <a:t>1) Data exploration wi</a:t>
-            </a:r>
-            <a:r>
-              <a:rPr lang="en-GB" sz="1100" dirty="0" err="1"/>
-              <a:t>th</a:t>
-            </a:r>
-            <a:r>
-              <a:rPr lang="en-NL" sz="1100" dirty="0"/>
-              <a:t> R and RMarkdown</a:t>
-            </a:r>
-          </a:p>
-          <a:p>
-            <a:r>
-              <a:rPr lang="en-NL" sz="1100" dirty="0"/>
-              <a:t>2) Data set engineering</a:t>
-            </a:r>
-          </a:p>
-          <a:p>
-            <a:r>
-              <a:rPr lang="en-NL" sz="1100" dirty="0"/>
-              <a:t>3) Pipeline building and automation</a:t>
-            </a:r>
-          </a:p>
-          <a:p>
-            <a:r>
-              <a:rPr lang="en-NL" sz="1100" dirty="0"/>
-              <a:t>4) Code versioning and project management</a:t>
-            </a:r>
-          </a:p>
-        </p:txBody>
-      </p:sp>
-      <p:sp>
-        <p:nvSpPr>
-          <p:cNvPr id="33" name="TextBox 32">
-            <a:extLst>
-              <a:ext uri="{FF2B5EF4-FFF2-40B4-BE49-F238E27FC236}">
-                <a16:creationId xmlns:a16="http://schemas.microsoft.com/office/drawing/2014/main" id="{1376AA3A-C8B4-A442-999F-571AB3CB27B9}"/>
-              </a:ext>
-            </a:extLst>
-          </p:cNvPr>
-          <p:cNvSpPr txBox="1"/>
-          <p:nvPr/>
-        </p:nvSpPr>
-        <p:spPr>
-          <a:xfrm>
-            <a:off x="5737613" y="4976945"/>
-            <a:ext cx="4232969" cy="1035122"/>
-          </a:xfrm>
-          <a:prstGeom prst="rect">
-            <a:avLst/>
-          </a:prstGeom>
-          <a:solidFill>
-            <a:srgbClr val="CC9832">
-              <a:alpha val="29804"/>
-            </a:srgbClr>
-          </a:solidFill>
-        </p:spPr>
-        <p:txBody>
-          <a:bodyPr wrap="square" rtlCol="0">
-            <a:noAutofit/>
-          </a:bodyPr>
-          <a:lstStyle/>
-          <a:p>
-            <a:r>
-              <a:rPr lang="en-NL" sz="1100" b="1" dirty="0"/>
-              <a:t>Buildling blocks (B1-B3)</a:t>
-            </a:r>
-          </a:p>
-          <a:p>
-            <a:r>
-              <a:rPr lang="en-NL" sz="1100" dirty="0"/>
-              <a:t>1) Analysis (e.g., correlations, linear regression)</a:t>
-            </a:r>
-          </a:p>
-          <a:p>
-            <a:r>
-              <a:rPr lang="en-NL" sz="1100" dirty="0"/>
-              <a:t>2) Deployment (manuscript preparation, packages, apps)</a:t>
-            </a:r>
-          </a:p>
-          <a:p>
-            <a:r>
-              <a:rPr lang="en-NL" sz="1100" dirty="0"/>
-              <a:t>3) Infrastructure: Computation &amp; storage</a:t>
-            </a:r>
-          </a:p>
-        </p:txBody>
-      </p:sp>
-      <p:sp>
-        <p:nvSpPr>
-          <p:cNvPr id="34" name="TextBox 33">
-            <a:extLst>
-              <a:ext uri="{FF2B5EF4-FFF2-40B4-BE49-F238E27FC236}">
-                <a16:creationId xmlns:a16="http://schemas.microsoft.com/office/drawing/2014/main" id="{98CD00BA-AD5D-9943-81AC-95D22DD838E0}"/>
-              </a:ext>
-            </a:extLst>
-          </p:cNvPr>
-          <p:cNvSpPr txBox="1"/>
-          <p:nvPr/>
-        </p:nvSpPr>
-        <p:spPr>
-          <a:xfrm>
-            <a:off x="2419614" y="1128710"/>
-            <a:ext cx="1268296" cy="261610"/>
-          </a:xfrm>
-          <a:prstGeom prst="rect">
-            <a:avLst/>
-          </a:prstGeom>
-          <a:noFill/>
-        </p:spPr>
-        <p:txBody>
-          <a:bodyPr wrap="none" rtlCol="0">
-            <a:spAutoFit/>
-          </a:bodyPr>
-          <a:lstStyle/>
-          <a:p>
-            <a:r>
-              <a:rPr lang="en-NL" sz="1100" i="1" dirty="0"/>
-              <a:t>Research workflow</a:t>
-            </a:r>
-          </a:p>
-        </p:txBody>
-      </p:sp>
-      <p:sp>
-        <p:nvSpPr>
-          <p:cNvPr id="40" name="Rectangle 39">
-            <a:extLst>
-              <a:ext uri="{FF2B5EF4-FFF2-40B4-BE49-F238E27FC236}">
-                <a16:creationId xmlns:a16="http://schemas.microsoft.com/office/drawing/2014/main" id="{6D510D6A-9112-384F-AEF4-CCD9D2D723F7}"/>
-              </a:ext>
-            </a:extLst>
-          </p:cNvPr>
-          <p:cNvSpPr/>
-          <p:nvPr/>
-        </p:nvSpPr>
-        <p:spPr>
-          <a:xfrm>
-            <a:off x="883323" y="2096515"/>
-            <a:ext cx="1305803" cy="468000"/>
-          </a:xfrm>
-          <a:prstGeom prst="rect">
-            <a:avLst/>
-          </a:prstGeom>
-          <a:solidFill>
-            <a:schemeClr val="accent4"/>
+            <a:schemeClr val="bg1"/>
           </a:solidFill>
         </p:spPr>
         <p:style>
@@ -5176,17 +4954,192 @@
                   <a:schemeClr val="tx1"/>
                 </a:solidFill>
               </a:rPr>
-              <a:t>Automate</a:t>
-            </a:r>
-          </a:p>
-        </p:txBody>
-      </p:sp>
-      <p:sp>
-        <p:nvSpPr>
-          <p:cNvPr id="41" name="Rectangle 40">
-            <a:extLst>
-              <a:ext uri="{FF2B5EF4-FFF2-40B4-BE49-F238E27FC236}">
-                <a16:creationId xmlns:a16="http://schemas.microsoft.com/office/drawing/2014/main" id="{EF9B825B-66E0-DD48-B94F-A4D7DA13CB2A}"/>
+              <a:t>Data </a:t>
+            </a:r>
+          </a:p>
+          <a:p>
+            <a:pPr algn="ctr"/>
+            <a:r>
+              <a:rPr lang="en-NL" sz="1600" dirty="0">
+                <a:solidFill>
+                  <a:schemeClr val="tx1"/>
+                </a:solidFill>
+              </a:rPr>
+              <a:t>preparation</a:t>
+            </a:r>
+          </a:p>
+        </p:txBody>
+      </p:sp>
+      <p:sp>
+        <p:nvSpPr>
+          <p:cNvPr id="32" name="TextBox 31">
+            <a:extLst>
+              <a:ext uri="{FF2B5EF4-FFF2-40B4-BE49-F238E27FC236}">
+                <a16:creationId xmlns:a16="http://schemas.microsoft.com/office/drawing/2014/main" id="{7B858282-D819-D84D-91DF-947CE524B0FA}"/>
+              </a:ext>
+            </a:extLst>
+          </p:cNvPr>
+          <p:cNvSpPr txBox="1"/>
+          <p:nvPr/>
+        </p:nvSpPr>
+        <p:spPr>
+          <a:xfrm>
+            <a:off x="1726142" y="4976945"/>
+            <a:ext cx="3814420" cy="1035122"/>
+          </a:xfrm>
+          <a:prstGeom prst="rect">
+            <a:avLst/>
+          </a:prstGeom>
+          <a:solidFill>
+            <a:srgbClr val="003365">
+              <a:alpha val="27843"/>
+            </a:srgbClr>
+          </a:solidFill>
+        </p:spPr>
+        <p:txBody>
+          <a:bodyPr wrap="none" rtlCol="0">
+            <a:noAutofit/>
+          </a:bodyPr>
+          <a:lstStyle/>
+          <a:p>
+            <a:r>
+              <a:rPr lang="en-NL" sz="1100" b="1" dirty="0"/>
+              <a:t>Tutorials (T1-T4)</a:t>
+            </a:r>
+          </a:p>
+          <a:p>
+            <a:r>
+              <a:rPr lang="en-NL" sz="1100" dirty="0"/>
+              <a:t>1) Data exploration wi</a:t>
+            </a:r>
+            <a:r>
+              <a:rPr lang="en-GB" sz="1100" dirty="0" err="1"/>
+              <a:t>th</a:t>
+            </a:r>
+            <a:r>
+              <a:rPr lang="en-NL" sz="1100" dirty="0"/>
+              <a:t> R and RMarkdown</a:t>
+            </a:r>
+          </a:p>
+          <a:p>
+            <a:r>
+              <a:rPr lang="en-NL" sz="1100" dirty="0"/>
+              <a:t>2) Data set engineering</a:t>
+            </a:r>
+          </a:p>
+          <a:p>
+            <a:r>
+              <a:rPr lang="en-NL" sz="1100" dirty="0"/>
+              <a:t>3) Pipeline building and automation</a:t>
+            </a:r>
+          </a:p>
+          <a:p>
+            <a:r>
+              <a:rPr lang="en-NL" sz="1100" dirty="0"/>
+              <a:t>4) Code versioning and project management</a:t>
+            </a:r>
+          </a:p>
+        </p:txBody>
+      </p:sp>
+      <p:sp>
+        <p:nvSpPr>
+          <p:cNvPr id="33" name="TextBox 32">
+            <a:extLst>
+              <a:ext uri="{FF2B5EF4-FFF2-40B4-BE49-F238E27FC236}">
+                <a16:creationId xmlns:a16="http://schemas.microsoft.com/office/drawing/2014/main" id="{1376AA3A-C8B4-A442-999F-571AB3CB27B9}"/>
+              </a:ext>
+            </a:extLst>
+          </p:cNvPr>
+          <p:cNvSpPr txBox="1"/>
+          <p:nvPr/>
+        </p:nvSpPr>
+        <p:spPr>
+          <a:xfrm>
+            <a:off x="5737613" y="4976945"/>
+            <a:ext cx="4232969" cy="1035122"/>
+          </a:xfrm>
+          <a:prstGeom prst="rect">
+            <a:avLst/>
+          </a:prstGeom>
+          <a:solidFill>
+            <a:srgbClr val="CC9832">
+              <a:alpha val="29804"/>
+            </a:srgbClr>
+          </a:solidFill>
+        </p:spPr>
+        <p:txBody>
+          <a:bodyPr wrap="square" rtlCol="0">
+            <a:noAutofit/>
+          </a:bodyPr>
+          <a:lstStyle/>
+          <a:p>
+            <a:r>
+              <a:rPr lang="en-NL" sz="1100" b="1" dirty="0"/>
+              <a:t>Buildling blocks (B1-B3)</a:t>
+            </a:r>
+          </a:p>
+          <a:p>
+            <a:r>
+              <a:rPr lang="en-NL" sz="1100" dirty="0"/>
+              <a:t>1) Analysis (e.g., correlations, linear regression)</a:t>
+            </a:r>
+          </a:p>
+          <a:p>
+            <a:r>
+              <a:rPr lang="en-NL" sz="1100" dirty="0"/>
+              <a:t>2) Deployment (manuscript preparation, packages, apps)</a:t>
+            </a:r>
+          </a:p>
+          <a:p>
+            <a:r>
+              <a:rPr lang="en-NL" sz="1100" dirty="0"/>
+              <a:t>3) Infrastructure: Computation &amp; storage</a:t>
+            </a:r>
+          </a:p>
+        </p:txBody>
+      </p:sp>
+      <p:sp>
+        <p:nvSpPr>
+          <p:cNvPr id="34" name="TextBox 33">
+            <a:extLst>
+              <a:ext uri="{FF2B5EF4-FFF2-40B4-BE49-F238E27FC236}">
+                <a16:creationId xmlns:a16="http://schemas.microsoft.com/office/drawing/2014/main" id="{98CD00BA-AD5D-9943-81AC-95D22DD838E0}"/>
+              </a:ext>
+            </a:extLst>
+          </p:cNvPr>
+          <p:cNvSpPr txBox="1"/>
+          <p:nvPr/>
+        </p:nvSpPr>
+        <p:spPr>
+          <a:xfrm>
+            <a:off x="2427127" y="874604"/>
+            <a:ext cx="6029132" cy="261610"/>
+          </a:xfrm>
+          <a:prstGeom prst="rect">
+            <a:avLst/>
+          </a:prstGeom>
+          <a:noFill/>
+        </p:spPr>
+        <p:txBody>
+          <a:bodyPr wrap="square" rtlCol="0">
+            <a:spAutoFit/>
+          </a:bodyPr>
+          <a:lstStyle/>
+          <a:p>
+            <a:pPr algn="ctr"/>
+            <a:r>
+              <a:rPr lang="en-NL" sz="1100" i="1" dirty="0"/>
+              <a:t>Research workflow</a:t>
+            </a:r>
+          </a:p>
+        </p:txBody>
+      </p:sp>
+      <p:sp>
+        <p:nvSpPr>
+          <p:cNvPr id="40" name="Rectangle 39">
+            <a:extLst>
+              <a:ext uri="{FF2B5EF4-FFF2-40B4-BE49-F238E27FC236}">
+                <a16:creationId xmlns:a16="http://schemas.microsoft.com/office/drawing/2014/main" id="{6D510D6A-9112-384F-AEF4-CCD9D2D723F7}"/>
               </a:ext>
             </a:extLst>
           </p:cNvPr>
@@ -5195,8 +5148,8 @@
         </p:nvSpPr>
         <p:spPr>
           <a:xfrm>
-            <a:off x="883323" y="845933"/>
-            <a:ext cx="1297645" cy="468000"/>
+            <a:off x="936331" y="2441075"/>
+            <a:ext cx="1305803" cy="468000"/>
           </a:xfrm>
           <a:prstGeom prst="rect">
             <a:avLst/>
@@ -5232,17 +5185,17 @@
                   <a:schemeClr val="tx1"/>
                 </a:solidFill>
               </a:rPr>
-              <a:t>Code</a:t>
-            </a:r>
-          </a:p>
-        </p:txBody>
-      </p:sp>
-      <p:sp>
-        <p:nvSpPr>
-          <p:cNvPr id="43" name="Rectangle 42">
-            <a:extLst>
-              <a:ext uri="{FF2B5EF4-FFF2-40B4-BE49-F238E27FC236}">
-                <a16:creationId xmlns:a16="http://schemas.microsoft.com/office/drawing/2014/main" id="{0EEBA686-7878-1543-B208-AF55F3113FED}"/>
+              <a:t>Automate</a:t>
+            </a:r>
+          </a:p>
+        </p:txBody>
+      </p:sp>
+      <p:sp>
+        <p:nvSpPr>
+          <p:cNvPr id="41" name="Rectangle 40">
+            <a:extLst>
+              <a:ext uri="{FF2B5EF4-FFF2-40B4-BE49-F238E27FC236}">
+                <a16:creationId xmlns:a16="http://schemas.microsoft.com/office/drawing/2014/main" id="{EF9B825B-66E0-DD48-B94F-A4D7DA13CB2A}"/>
               </a:ext>
             </a:extLst>
           </p:cNvPr>
@@ -5251,7 +5204,7 @@
         </p:nvSpPr>
         <p:spPr>
           <a:xfrm>
-            <a:off x="883323" y="1471224"/>
+            <a:off x="936331" y="1190493"/>
             <a:ext cx="1297645" cy="468000"/>
           </a:xfrm>
           <a:prstGeom prst="rect">
@@ -5288,17 +5241,17 @@
                   <a:schemeClr val="tx1"/>
                 </a:solidFill>
               </a:rPr>
-              <a:t>Collaborate</a:t>
-            </a:r>
-          </a:p>
-        </p:txBody>
-      </p:sp>
-      <p:sp>
-        <p:nvSpPr>
-          <p:cNvPr id="44" name="Rectangle 43">
-            <a:extLst>
-              <a:ext uri="{FF2B5EF4-FFF2-40B4-BE49-F238E27FC236}">
-                <a16:creationId xmlns:a16="http://schemas.microsoft.com/office/drawing/2014/main" id="{01139B43-E723-B544-A165-B028FF7B8B76}"/>
+              <a:t>Code</a:t>
+            </a:r>
+          </a:p>
+        </p:txBody>
+      </p:sp>
+      <p:sp>
+        <p:nvSpPr>
+          <p:cNvPr id="43" name="Rectangle 42">
+            <a:extLst>
+              <a:ext uri="{FF2B5EF4-FFF2-40B4-BE49-F238E27FC236}">
+                <a16:creationId xmlns:a16="http://schemas.microsoft.com/office/drawing/2014/main" id="{0EEBA686-7878-1543-B208-AF55F3113FED}"/>
               </a:ext>
             </a:extLst>
           </p:cNvPr>
@@ -5307,8 +5260,8 @@
         </p:nvSpPr>
         <p:spPr>
           <a:xfrm>
-            <a:off x="883323" y="2721806"/>
-            <a:ext cx="1305803" cy="468000"/>
+            <a:off x="936331" y="1815784"/>
+            <a:ext cx="1297645" cy="468000"/>
           </a:xfrm>
           <a:prstGeom prst="rect">
             <a:avLst/>
@@ -5344,7 +5297,7 @@
                   <a:schemeClr val="tx1"/>
                 </a:solidFill>
               </a:rPr>
-              <a:t>Scale up</a:t>
+              <a:t>Collaborate</a:t>
             </a:r>
           </a:p>
         </p:txBody>
@@ -5363,8 +5316,8 @@
         </p:nvSpPr>
         <p:spPr>
           <a:xfrm>
-            <a:off x="785459" y="560842"/>
-            <a:ext cx="1204176" cy="261610"/>
+            <a:off x="936331" y="864684"/>
+            <a:ext cx="1271180" cy="271530"/>
           </a:xfrm>
           <a:prstGeom prst="rect">
             <a:avLst/>
@@ -5372,14 +5325,15 @@
           <a:noFill/>
         </p:spPr>
         <p:txBody>
-          <a:bodyPr wrap="none" rtlCol="0">
+          <a:bodyPr wrap="square" rtlCol="0">
             <a:spAutoFit/>
           </a:bodyPr>
           <a:lstStyle/>
           <a:p>
+            <a:pPr algn="ctr"/>
             <a:r>
               <a:rPr lang="en-NL" sz="1100" i="1" dirty="0"/>
-              <a:t>”Way of working”</a:t>
+              <a:t>Way of working</a:t>
             </a:r>
           </a:p>
         </p:txBody>
@@ -5398,8 +5352,8 @@
         </p:nvSpPr>
         <p:spPr>
           <a:xfrm>
-            <a:off x="2477142" y="2361602"/>
-            <a:ext cx="7011585" cy="395055"/>
+            <a:off x="2477143" y="2361602"/>
+            <a:ext cx="5979116" cy="395055"/>
           </a:xfrm>
           <a:prstGeom prst="rect">
             <a:avLst/>
@@ -5465,9 +5419,6 @@
                     <p:cTn id="3" fill="hold">
                       <p:stCondLst>
                         <p:cond delay="indefinite"/>
-                        <p:cond evt="onBegin" delay="0">
-                          <p:tn val="2"/>
-                        </p:cond>
                       </p:stCondLst>
                       <p:childTnLst>
                         <p:par>
@@ -5477,7 +5428,7 @@
                             </p:stCondLst>
                             <p:childTnLst>
                               <p:par>
-                                <p:cTn id="5" presetID="1" presetClass="entr" presetSubtype="0" fill="hold" nodeType="withEffect">
+                                <p:cTn id="5" presetID="1" presetClass="entr" presetSubtype="0" fill="hold" grpId="0" nodeType="clickEffect">
                                   <p:stCondLst>
                                     <p:cond delay="0"/>
                                   </p:stCondLst>
@@ -5485,51 +5436,6 @@
                                     <p:set>
                                       <p:cBhvr>
                                         <p:cTn id="6" dur="1" fill="hold">
-                                          <p:stCondLst>
-                                            <p:cond delay="0"/>
-                                          </p:stCondLst>
-                                        </p:cTn>
-                                        <p:tgtEl>
-                                          <p:spTgt spid="55"/>
-                                        </p:tgtEl>
-                                        <p:attrNameLst>
-                                          <p:attrName>style.visibility</p:attrName>
-                                        </p:attrNameLst>
-                                      </p:cBhvr>
-                                      <p:to>
-                                        <p:strVal val="visible"/>
-                                      </p:to>
-                                    </p:set>
-                                  </p:childTnLst>
-                                </p:cTn>
-                              </p:par>
-                            </p:childTnLst>
-                          </p:cTn>
-                        </p:par>
-                      </p:childTnLst>
-                    </p:cTn>
-                  </p:par>
-                  <p:par>
-                    <p:cTn id="7" fill="hold">
-                      <p:stCondLst>
-                        <p:cond delay="indefinite"/>
-                      </p:stCondLst>
-                      <p:childTnLst>
-                        <p:par>
-                          <p:cTn id="8" fill="hold">
-                            <p:stCondLst>
-                              <p:cond delay="0"/>
-                            </p:stCondLst>
-                            <p:childTnLst>
-                              <p:par>
-                                <p:cTn id="9" presetID="1" presetClass="entr" presetSubtype="0" fill="hold" grpId="0" nodeType="clickEffect">
-                                  <p:stCondLst>
-                                    <p:cond delay="0"/>
-                                  </p:stCondLst>
-                                  <p:childTnLst>
-                                    <p:set>
-                                      <p:cBhvr>
-                                        <p:cTn id="10" dur="1" fill="hold">
                                           <p:stCondLst>
                                             <p:cond delay="0"/>
                                           </p:stCondLst>
@@ -5549,14 +5455,14 @@
                                 </p:cTn>
                               </p:par>
                               <p:par>
-                                <p:cTn id="11" presetID="1" presetClass="entr" presetSubtype="0" fill="hold" grpId="0" nodeType="withEffect">
+                                <p:cTn id="7" presetID="1" presetClass="entr" presetSubtype="0" fill="hold" grpId="0" nodeType="withEffect">
                                   <p:stCondLst>
                                     <p:cond delay="0"/>
                                   </p:stCondLst>
                                   <p:childTnLst>
                                     <p:set>
                                       <p:cBhvr>
-                                        <p:cTn id="12" dur="1" fill="hold">
+                                        <p:cTn id="8" dur="1" fill="hold">
                                           <p:stCondLst>
                                             <p:cond delay="0"/>
                                           </p:stCondLst>
@@ -5576,65 +5482,20 @@
                                 </p:cTn>
                               </p:par>
                               <p:par>
-                                <p:cTn id="13" presetID="1" presetClass="entr" presetSubtype="0" fill="hold" grpId="0" nodeType="withEffect">
+                                <p:cTn id="9" presetID="1" presetClass="entr" presetSubtype="0" fill="hold" grpId="0" nodeType="withEffect">
                                   <p:stCondLst>
                                     <p:cond delay="0"/>
                                   </p:stCondLst>
                                   <p:childTnLst>
                                     <p:set>
                                       <p:cBhvr>
-                                        <p:cTn id="14" dur="1" fill="hold">
+                                        <p:cTn id="10" dur="1" fill="hold">
                                           <p:stCondLst>
                                             <p:cond delay="0"/>
                                           </p:stCondLst>
                                         </p:cTn>
                                         <p:tgtEl>
                                           <p:spTgt spid="43"/>
-                                        </p:tgtEl>
-                                        <p:attrNameLst>
-                                          <p:attrName>style.visibility</p:attrName>
-                                        </p:attrNameLst>
-                                      </p:cBhvr>
-                                      <p:to>
-                                        <p:strVal val="visible"/>
-                                      </p:to>
-                                    </p:set>
-                                  </p:childTnLst>
-                                </p:cTn>
-                              </p:par>
-                            </p:childTnLst>
-                          </p:cTn>
-                        </p:par>
-                      </p:childTnLst>
-                    </p:cTn>
-                  </p:par>
-                  <p:par>
-                    <p:cTn id="15" fill="hold">
-                      <p:stCondLst>
-                        <p:cond delay="indefinite"/>
-                      </p:stCondLst>
-                      <p:childTnLst>
-                        <p:par>
-                          <p:cTn id="16" fill="hold">
-                            <p:stCondLst>
-                              <p:cond delay="0"/>
-                            </p:stCondLst>
-                            <p:childTnLst>
-                              <p:par>
-                                <p:cTn id="17" presetID="1" presetClass="entr" presetSubtype="0" fill="hold" grpId="0" nodeType="clickEffect">
-                                  <p:stCondLst>
-                                    <p:cond delay="0"/>
-                                  </p:stCondLst>
-                                  <p:childTnLst>
-                                    <p:set>
-                                      <p:cBhvr>
-                                        <p:cTn id="18" dur="1" fill="hold">
-                                          <p:stCondLst>
-                                            <p:cond delay="0"/>
-                                          </p:stCondLst>
-                                        </p:cTn>
-                                        <p:tgtEl>
-                                          <p:spTgt spid="44"/>
                                         </p:tgtEl>
                                         <p:attrNameLst>
                                           <p:attrName>style.visibility</p:attrName>
@@ -5678,7 +5539,6 @@
       <p:bldP spid="40" grpId="0" animBg="1"/>
       <p:bldP spid="41" grpId="0" animBg="1"/>
       <p:bldP spid="43" grpId="0" animBg="1"/>
-      <p:bldP spid="44" grpId="0" animBg="1"/>
     </p:bldLst>
   </p:timing>
 </p:sld>

</xml_diff>